<commit_message>
edit timing of asymptotic-blunders.pptx
</commit_message>
<xml_diff>
--- a/spring13/slides13/asymptotic-blunders.pptx
+++ b/spring13/slides13/asymptotic-blunders.pptx
@@ -2130,22 +2130,7 @@
                 <a:uFillTx/>
                 <a:latin typeface="Comic Sans MS" pitchFamily="66" charset="0"/>
               </a:rPr>
-              <a:t>Albert R Meyer,                  April </a:t>
-            </a:r>
-            <a:r>
-              <a:rPr kumimoji="0" lang="en-US" sz="1200" b="0" i="0" u="none" strike="noStrike" kern="1200" cap="none" spc="0" normalizeH="0" baseline="0" noProof="0" dirty="0" smtClean="0">
-                <a:ln>
-                  <a:noFill/>
-                </a:ln>
-                <a:solidFill>
-                  <a:schemeClr val="tx1"/>
-                </a:solidFill>
-                <a:effectLst/>
-                <a:uLnTx/>
-                <a:uFillTx/>
-                <a:latin typeface="Comic Sans MS" pitchFamily="66" charset="0"/>
-              </a:rPr>
-              <a:t>10, 2013</a:t>
+              <a:t>Albert R Meyer,                  April 10, 2013</a:t>
             </a:r>
             <a:endParaRPr kumimoji="0" lang="en-US" sz="1200" b="0" i="0" u="none" strike="noStrike" kern="1200" cap="none" spc="0" normalizeH="0" baseline="0" noProof="0" dirty="0">
               <a:ln>
@@ -2726,11 +2711,11 @@
   <p:clrMapOvr>
     <a:masterClrMapping/>
   </p:clrMapOvr>
-  <mc:AlternateContent xmlns:mc="http://schemas.openxmlformats.org/markup-compatibility/2006">
-    <mc:Choice xmlns:p14="http://schemas.microsoft.com/office/powerpoint/2010/main" Requires="p14">
+  <mc:AlternateContent xmlns:mc="http://schemas.openxmlformats.org/markup-compatibility/2006" xmlns:p14="http://schemas.microsoft.com/office/powerpoint/2010/main">
+    <mc:Choice Requires="p14">
       <p:transition spd="slow" p14:dur="2000" advClick="0"/>
     </mc:Choice>
-    <mc:Fallback>
+    <mc:Fallback xmlns="">
       <p:transition xmlns:p14="http://schemas.microsoft.com/office/powerpoint/2010/main" spd="slow" advClick="0"/>
     </mc:Fallback>
   </mc:AlternateContent>
@@ -3258,7 +3243,7 @@
           <a:graphicData uri="http://schemas.openxmlformats.org/presentationml/2006/ole">
             <mc:AlternateContent xmlns:mc="http://schemas.openxmlformats.org/markup-compatibility/2006">
               <mc:Choice xmlns:v="urn:schemas-microsoft-com:vml" Requires="v">
-                <p:oleObj spid="_x0000_s161826" name="Equation" r:id="rId4" imgW="114120" imgH="215640" progId="Equation.3">
+                <p:oleObj spid="_x0000_s161829" name="Equation" r:id="rId4" imgW="114120" imgH="215640" progId="Equation.3">
                   <p:embed/>
                 </p:oleObj>
               </mc:Choice>
@@ -3853,7 +3838,7 @@
           <a:graphicData uri="http://schemas.openxmlformats.org/presentationml/2006/ole">
             <mc:AlternateContent xmlns:mc="http://schemas.openxmlformats.org/markup-compatibility/2006">
               <mc:Choice xmlns:v="urn:schemas-microsoft-com:vml" Requires="v">
-                <p:oleObj spid="_x0000_s162852" name="Equation" r:id="rId4" imgW="114120" imgH="215640" progId="Equation.3">
+                <p:oleObj spid="_x0000_s162855" name="Equation" r:id="rId4" imgW="114120" imgH="215640" progId="Equation.3">
                   <p:embed/>
                 </p:oleObj>
               </mc:Choice>
@@ -4079,13 +4064,13 @@
   <p:clrMapOvr>
     <a:masterClrMapping/>
   </p:clrMapOvr>
-  <mc:AlternateContent xmlns:mc="http://schemas.openxmlformats.org/markup-compatibility/2006">
-    <mc:Choice xmlns:p14="http://schemas.microsoft.com/office/powerpoint/2010/main" Requires="p14">
+  <mc:AlternateContent xmlns:mc="http://schemas.openxmlformats.org/markup-compatibility/2006" xmlns:p14="http://schemas.microsoft.com/office/powerpoint/2010/main">
+    <mc:Choice Requires="p14">
       <p:transition spd="slow" p14:dur="900" advClick="0">
         <p:fade/>
       </p:transition>
     </mc:Choice>
-    <mc:Fallback>
+    <mc:Fallback xmlns="">
       <p:transition xmlns:p14="http://schemas.microsoft.com/office/powerpoint/2010/main" spd="slow" advClick="0">
         <p:fade/>
       </p:transition>
@@ -4431,7 +4416,7 @@
           <a:graphicData uri="http://schemas.openxmlformats.org/presentationml/2006/ole">
             <mc:AlternateContent xmlns:mc="http://schemas.openxmlformats.org/markup-compatibility/2006">
               <mc:Choice xmlns:v="urn:schemas-microsoft-com:vml" Requires="v">
-                <p:oleObj spid="_x0000_s163920" name="Equation" r:id="rId4" imgW="723900" imgH="482600" progId="Equation.DSMT4">
+                <p:oleObj spid="_x0000_s163927" name="Equation" r:id="rId4" imgW="723900" imgH="482600" progId="Equation.DSMT4">
                   <p:embed/>
                 </p:oleObj>
               </mc:Choice>
@@ -4495,7 +4480,7 @@
           <a:graphicData uri="http://schemas.openxmlformats.org/presentationml/2006/ole">
             <mc:AlternateContent xmlns:mc="http://schemas.openxmlformats.org/markup-compatibility/2006">
               <mc:Choice xmlns:v="urn:schemas-microsoft-com:vml" Requires="v">
-                <p:oleObj spid="_x0000_s163921" name="Equation" r:id="rId6" imgW="114120" imgH="215640" progId="Equation.3">
+                <p:oleObj spid="_x0000_s163928" name="Equation" r:id="rId6" imgW="114120" imgH="215640" progId="Equation.3">
                   <p:embed/>
                 </p:oleObj>
               </mc:Choice>
@@ -4610,7 +4595,7 @@
           <a:graphicData uri="http://schemas.openxmlformats.org/presentationml/2006/ole">
             <mc:AlternateContent xmlns:mc="http://schemas.openxmlformats.org/markup-compatibility/2006">
               <mc:Choice xmlns:v="urn:schemas-microsoft-com:vml" Requires="v">
-                <p:oleObj spid="_x0000_s163922" name="Equation" r:id="rId8" imgW="762000" imgH="495300" progId="Equation.DSMT4">
+                <p:oleObj spid="_x0000_s163929" name="Equation" r:id="rId8" imgW="762000" imgH="495300" progId="Equation.DSMT4">
                   <p:embed/>
                 </p:oleObj>
               </mc:Choice>
@@ -4669,13 +4654,13 @@
   <p:clrMapOvr>
     <a:masterClrMapping/>
   </p:clrMapOvr>
-  <mc:AlternateContent xmlns:mc="http://schemas.openxmlformats.org/markup-compatibility/2006">
-    <mc:Choice xmlns:p14="http://schemas.microsoft.com/office/powerpoint/2010/main" Requires="p14">
+  <mc:AlternateContent xmlns:mc="http://schemas.openxmlformats.org/markup-compatibility/2006" xmlns:p14="http://schemas.microsoft.com/office/powerpoint/2010/main">
+    <mc:Choice Requires="p14">
       <p:transition spd="slow" p14:dur="900" advClick="0">
         <p:fade thruBlk="1"/>
       </p:transition>
     </mc:Choice>
-    <mc:Fallback>
+    <mc:Fallback xmlns="">
       <p:transition xmlns:p14="http://schemas.microsoft.com/office/powerpoint/2010/main" spd="slow" advClick="0">
         <p:fade thruBlk="1"/>
       </p:transition>
@@ -5067,7 +5052,7 @@
           <a:graphicData uri="http://schemas.openxmlformats.org/presentationml/2006/ole">
             <mc:AlternateContent xmlns:mc="http://schemas.openxmlformats.org/markup-compatibility/2006">
               <mc:Choice xmlns:v="urn:schemas-microsoft-com:vml" Requires="v">
-                <p:oleObj spid="_x0000_s164950" name="Equation" r:id="rId4" imgW="1790700" imgH="444500" progId="Equation.DSMT4">
+                <p:oleObj spid="_x0000_s164957" name="Equation" r:id="rId4" imgW="1790700" imgH="444500" progId="Equation.DSMT4">
                   <p:embed/>
                 </p:oleObj>
               </mc:Choice>
@@ -5156,7 +5141,7 @@
           <a:graphicData uri="http://schemas.openxmlformats.org/presentationml/2006/ole">
             <mc:AlternateContent xmlns:mc="http://schemas.openxmlformats.org/markup-compatibility/2006">
               <mc:Choice xmlns:v="urn:schemas-microsoft-com:vml" Requires="v">
-                <p:oleObj spid="_x0000_s164951" name="Equation" r:id="rId6" imgW="114120" imgH="215640" progId="Equation.3">
+                <p:oleObj spid="_x0000_s164958" name="Equation" r:id="rId6" imgW="114120" imgH="215640" progId="Equation.3">
                   <p:embed/>
                 </p:oleObj>
               </mc:Choice>
@@ -5331,7 +5316,7 @@
           <a:graphicData uri="http://schemas.openxmlformats.org/presentationml/2006/ole">
             <mc:AlternateContent xmlns:mc="http://schemas.openxmlformats.org/markup-compatibility/2006">
               <mc:Choice xmlns:v="urn:schemas-microsoft-com:vml" Requires="v">
-                <p:oleObj spid="_x0000_s164952" name="Equation" r:id="rId8" imgW="723900" imgH="482600" progId="Equation.DSMT4">
+                <p:oleObj spid="_x0000_s164959" name="Equation" r:id="rId8" imgW="723900" imgH="482600" progId="Equation.DSMT4">
                   <p:embed/>
                 </p:oleObj>
               </mc:Choice>

</xml_diff>